<commit_message>
final revision after final call
</commit_message>
<xml_diff>
--- a/CapstoneProject/CapstoneFinalReportPresentation-RentalInvestmentAnalysis.pptx
+++ b/CapstoneProject/CapstoneFinalReportPresentation-RentalInvestmentAnalysis.pptx
@@ -5,7 +5,7 @@
     <p:sldMasterId id="2147483648" r:id="rId1"/>
   </p:sldMasterIdLst>
   <p:notesMasterIdLst>
-    <p:notesMasterId r:id="rId20"/>
+    <p:notesMasterId r:id="rId22"/>
   </p:notesMasterIdLst>
   <p:sldIdLst>
     <p:sldId id="256" r:id="rId2"/>
@@ -17,15 +17,17 @@
     <p:sldId id="262" r:id="rId8"/>
     <p:sldId id="263" r:id="rId9"/>
     <p:sldId id="264" r:id="rId10"/>
-    <p:sldId id="265" r:id="rId11"/>
-    <p:sldId id="266" r:id="rId12"/>
-    <p:sldId id="267" r:id="rId13"/>
-    <p:sldId id="268" r:id="rId14"/>
-    <p:sldId id="270" r:id="rId15"/>
-    <p:sldId id="271" r:id="rId16"/>
-    <p:sldId id="272" r:id="rId17"/>
-    <p:sldId id="277" r:id="rId18"/>
-    <p:sldId id="278" r:id="rId19"/>
+    <p:sldId id="279" r:id="rId11"/>
+    <p:sldId id="265" r:id="rId12"/>
+    <p:sldId id="266" r:id="rId13"/>
+    <p:sldId id="267" r:id="rId14"/>
+    <p:sldId id="268" r:id="rId15"/>
+    <p:sldId id="270" r:id="rId16"/>
+    <p:sldId id="271" r:id="rId17"/>
+    <p:sldId id="272" r:id="rId18"/>
+    <p:sldId id="277" r:id="rId19"/>
+    <p:sldId id="280" r:id="rId20"/>
+    <p:sldId id="278" r:id="rId21"/>
   </p:sldIdLst>
   <p:sldSz cx="9144000" cy="6858000" type="screen4x3"/>
   <p:notesSz cx="6858000" cy="9144000"/>
@@ -209,7 +211,7 @@
           <a:p>
             <a:fld id="{4411A98B-986A-4E43-9804-48545DDD3CF3}" type="datetimeFigureOut">
               <a:rPr lang="en-US" smtClean="0"/>
-              <a:t>12/6/2016</a:t>
+              <a:t>12/11/2016</a:t>
             </a:fld>
             <a:endParaRPr lang="en-US" dirty="0"/>
           </a:p>
@@ -710,7 +712,7 @@
           <a:p>
             <a:fld id="{575F4577-E8BB-438D-90DF-4BFC8619C46D}" type="slidenum">
               <a:rPr lang="en-US" smtClean="0"/>
-              <a:t>16</a:t>
+              <a:t>17</a:t>
             </a:fld>
             <a:endParaRPr lang="en-US" dirty="0"/>
           </a:p>
@@ -720,6 +722,228 @@
     <p:extLst>
       <p:ext uri="{BB962C8B-B14F-4D97-AF65-F5344CB8AC3E}">
         <p14:creationId xmlns:p14="http://schemas.microsoft.com/office/powerpoint/2010/main" val="514230102"/>
+      </p:ext>
+    </p:extLst>
+  </p:cSld>
+  <p:clrMapOvr>
+    <a:masterClrMapping/>
+  </p:clrMapOvr>
+</p:notes>
+</file>
+
+<file path=ppt/notesSlides/notesSlide11.xml><?xml version="1.0" encoding="utf-8"?>
+<p:notes xmlns:a="http://schemas.openxmlformats.org/drawingml/2006/main" xmlns:r="http://schemas.openxmlformats.org/officeDocument/2006/relationships" xmlns:p="http://schemas.openxmlformats.org/presentationml/2006/main">
+  <p:cSld>
+    <p:spTree>
+      <p:nvGrpSpPr>
+        <p:cNvPr id="1" name=""/>
+        <p:cNvGrpSpPr/>
+        <p:nvPr/>
+      </p:nvGrpSpPr>
+      <p:grpSpPr>
+        <a:xfrm>
+          <a:off x="0" y="0"/>
+          <a:ext cx="0" cy="0"/>
+          <a:chOff x="0" y="0"/>
+          <a:chExt cx="0" cy="0"/>
+        </a:xfrm>
+      </p:grpSpPr>
+      <p:sp>
+        <p:nvSpPr>
+          <p:cNvPr id="2" name="Slide Image Placeholder 1"/>
+          <p:cNvSpPr>
+            <a:spLocks noGrp="1" noRot="1" noChangeAspect="1"/>
+          </p:cNvSpPr>
+          <p:nvPr>
+            <p:ph type="sldImg"/>
+          </p:nvPr>
+        </p:nvSpPr>
+        <p:spPr/>
+      </p:sp>
+      <p:sp>
+        <p:nvSpPr>
+          <p:cNvPr id="3" name="Notes Placeholder 2"/>
+          <p:cNvSpPr>
+            <a:spLocks noGrp="1"/>
+          </p:cNvSpPr>
+          <p:nvPr>
+            <p:ph type="body" idx="1"/>
+          </p:nvPr>
+        </p:nvSpPr>
+        <p:spPr/>
+        <p:txBody>
+          <a:bodyPr/>
+          <a:lstStyle/>
+          <a:p>
+            <a:pPr marL="171450" marR="0" indent="-171450" algn="l" defTabSz="914400" rtl="0" eaLnBrk="1" fontAlgn="auto" latinLnBrk="0" hangingPunct="1">
+              <a:lnSpc>
+                <a:spcPct val="100000"/>
+              </a:lnSpc>
+              <a:spcBef>
+                <a:spcPts val="0"/>
+              </a:spcBef>
+              <a:spcAft>
+                <a:spcPts val="0"/>
+              </a:spcAft>
+              <a:buClrTx/>
+              <a:buSzTx/>
+              <a:buFont typeface="Arial" panose="020B0604020202020204" pitchFamily="34" charset="0"/>
+              <a:buChar char="•"/>
+              <a:tabLst/>
+              <a:defRPr/>
+            </a:pPr>
+            <a:r>
+              <a:rPr lang="en-US" dirty="0" smtClean="0"/>
+              <a:t>This analysis tried to use the US housing price data and the IRS data to help investors discover high potential California zip codes for purchasing rental properties.  Through the analysis, some unique characteristics of the high potential “hot” zip codes are identified; for example, “hot” zip codes are spread over Northern and Southern California.  Also, “hot” zip codes have slightly higher estimated rent per square foot as well as price-to-rent ratio although their adjusted gross income is lower than “cold” zip codes.  “Hot” zip codes generally have lower home price than “cold” zip codes for all numbers of bedroom home except those one bedroom homes.</a:t>
+            </a:r>
+          </a:p>
+          <a:p>
+            <a:pPr marL="171450" indent="-171450">
+              <a:buFont typeface="Arial" panose="020B0604020202020204" pitchFamily="34" charset="0"/>
+              <a:buChar char="•"/>
+            </a:pPr>
+            <a:endParaRPr lang="en-US" dirty="0"/>
+          </a:p>
+        </p:txBody>
+      </p:sp>
+      <p:sp>
+        <p:nvSpPr>
+          <p:cNvPr id="4" name="Slide Number Placeholder 3"/>
+          <p:cNvSpPr>
+            <a:spLocks noGrp="1"/>
+          </p:cNvSpPr>
+          <p:nvPr>
+            <p:ph type="sldNum" sz="quarter" idx="10"/>
+          </p:nvPr>
+        </p:nvSpPr>
+        <p:spPr/>
+        <p:txBody>
+          <a:bodyPr/>
+          <a:lstStyle/>
+          <a:p>
+            <a:fld id="{575F4577-E8BB-438D-90DF-4BFC8619C46D}" type="slidenum">
+              <a:rPr lang="en-US" smtClean="0"/>
+              <a:t>18</a:t>
+            </a:fld>
+            <a:endParaRPr lang="en-US" dirty="0"/>
+          </a:p>
+        </p:txBody>
+      </p:sp>
+    </p:spTree>
+    <p:extLst>
+      <p:ext uri="{BB962C8B-B14F-4D97-AF65-F5344CB8AC3E}">
+        <p14:creationId xmlns:p14="http://schemas.microsoft.com/office/powerpoint/2010/main" val="2424566156"/>
+      </p:ext>
+    </p:extLst>
+  </p:cSld>
+  <p:clrMapOvr>
+    <a:masterClrMapping/>
+  </p:clrMapOvr>
+</p:notes>
+</file>
+
+<file path=ppt/notesSlides/notesSlide12.xml><?xml version="1.0" encoding="utf-8"?>
+<p:notes xmlns:a="http://schemas.openxmlformats.org/drawingml/2006/main" xmlns:r="http://schemas.openxmlformats.org/officeDocument/2006/relationships" xmlns:p="http://schemas.openxmlformats.org/presentationml/2006/main">
+  <p:cSld>
+    <p:spTree>
+      <p:nvGrpSpPr>
+        <p:cNvPr id="1" name=""/>
+        <p:cNvGrpSpPr/>
+        <p:nvPr/>
+      </p:nvGrpSpPr>
+      <p:grpSpPr>
+        <a:xfrm>
+          <a:off x="0" y="0"/>
+          <a:ext cx="0" cy="0"/>
+          <a:chOff x="0" y="0"/>
+          <a:chExt cx="0" cy="0"/>
+        </a:xfrm>
+      </p:grpSpPr>
+      <p:sp>
+        <p:nvSpPr>
+          <p:cNvPr id="2" name="Slide Image Placeholder 1"/>
+          <p:cNvSpPr>
+            <a:spLocks noGrp="1" noRot="1" noChangeAspect="1"/>
+          </p:cNvSpPr>
+          <p:nvPr>
+            <p:ph type="sldImg"/>
+          </p:nvPr>
+        </p:nvSpPr>
+        <p:spPr/>
+      </p:sp>
+      <p:sp>
+        <p:nvSpPr>
+          <p:cNvPr id="3" name="Notes Placeholder 2"/>
+          <p:cNvSpPr>
+            <a:spLocks noGrp="1"/>
+          </p:cNvSpPr>
+          <p:nvPr>
+            <p:ph type="body" idx="1"/>
+          </p:nvPr>
+        </p:nvSpPr>
+        <p:spPr/>
+        <p:txBody>
+          <a:bodyPr/>
+          <a:lstStyle/>
+          <a:p>
+            <a:pPr marL="171450" marR="0" indent="-171450" algn="l" defTabSz="914400" rtl="0" eaLnBrk="1" fontAlgn="auto" latinLnBrk="0" hangingPunct="1">
+              <a:lnSpc>
+                <a:spcPct val="100000"/>
+              </a:lnSpc>
+              <a:spcBef>
+                <a:spcPts val="0"/>
+              </a:spcBef>
+              <a:spcAft>
+                <a:spcPts val="0"/>
+              </a:spcAft>
+              <a:buClrTx/>
+              <a:buSzTx/>
+              <a:buFont typeface="Arial" panose="020B0604020202020204" pitchFamily="34" charset="0"/>
+              <a:buChar char="•"/>
+              <a:tabLst/>
+              <a:defRPr/>
+            </a:pPr>
+            <a:r>
+              <a:rPr lang="en-US" dirty="0" smtClean="0"/>
+              <a:t>To develop a prediction model for “hot” zip codes, I tried two modeling algorithm of logistic regression and support vector classifier(SVC).  SVC turned out be a better algorithm.  The best SVC model delivered a 96% precision score compared to logistic regression model’s 0.71.  Rental investors could use my SVC based model to find the right zip codes for their next profitable rental investment. </a:t>
+            </a:r>
+          </a:p>
+          <a:p>
+            <a:pPr marL="171450" indent="-171450">
+              <a:buFont typeface="Arial" panose="020B0604020202020204" pitchFamily="34" charset="0"/>
+              <a:buChar char="•"/>
+            </a:pPr>
+            <a:endParaRPr lang="en-US" dirty="0"/>
+          </a:p>
+        </p:txBody>
+      </p:sp>
+      <p:sp>
+        <p:nvSpPr>
+          <p:cNvPr id="4" name="Slide Number Placeholder 3"/>
+          <p:cNvSpPr>
+            <a:spLocks noGrp="1"/>
+          </p:cNvSpPr>
+          <p:nvPr>
+            <p:ph type="sldNum" sz="quarter" idx="10"/>
+          </p:nvPr>
+        </p:nvSpPr>
+        <p:spPr/>
+        <p:txBody>
+          <a:bodyPr/>
+          <a:lstStyle/>
+          <a:p>
+            <a:fld id="{575F4577-E8BB-438D-90DF-4BFC8619C46D}" type="slidenum">
+              <a:rPr lang="en-US" smtClean="0"/>
+              <a:t>19</a:t>
+            </a:fld>
+            <a:endParaRPr lang="en-US" dirty="0"/>
+          </a:p>
+        </p:txBody>
+      </p:sp>
+    </p:spTree>
+    <p:extLst>
+      <p:ext uri="{BB962C8B-B14F-4D97-AF65-F5344CB8AC3E}">
+        <p14:creationId xmlns:p14="http://schemas.microsoft.com/office/powerpoint/2010/main" val="4256531454"/>
       </p:ext>
     </p:extLst>
   </p:cSld>
@@ -1565,7 +1789,7 @@
           <a:p>
             <a:fld id="{575F4577-E8BB-438D-90DF-4BFC8619C46D}" type="slidenum">
               <a:rPr lang="en-US" smtClean="0"/>
-              <a:t>10</a:t>
+              <a:t>11</a:t>
             </a:fld>
             <a:endParaRPr lang="en-US" dirty="0"/>
           </a:p>
@@ -1709,7 +1933,7 @@
           <a:p>
             <a:fld id="{575F4577-E8BB-438D-90DF-4BFC8619C46D}" type="slidenum">
               <a:rPr lang="en-US" smtClean="0"/>
-              <a:t>11</a:t>
+              <a:t>12</a:t>
             </a:fld>
             <a:endParaRPr lang="en-US" dirty="0"/>
           </a:p>
@@ -1888,7 +2112,7 @@
           <a:p>
             <a:fld id="{575F4577-E8BB-438D-90DF-4BFC8619C46D}" type="slidenum">
               <a:rPr lang="en-US" smtClean="0"/>
-              <a:t>12</a:t>
+              <a:t>13</a:t>
             </a:fld>
             <a:endParaRPr lang="en-US" dirty="0"/>
           </a:p>
@@ -2044,7 +2268,7 @@
           <a:p>
             <a:fld id="{575F4577-E8BB-438D-90DF-4BFC8619C46D}" type="slidenum">
               <a:rPr lang="en-US" smtClean="0"/>
-              <a:t>13</a:t>
+              <a:t>14</a:t>
             </a:fld>
             <a:endParaRPr lang="en-US" dirty="0"/>
           </a:p>
@@ -2244,7 +2468,7 @@
           <a:p>
             <a:fld id="{CC1341B9-C675-4BEE-89AB-10FADA636FB9}" type="datetimeFigureOut">
               <a:rPr lang="en-US" smtClean="0"/>
-              <a:t>12/6/2016</a:t>
+              <a:t>12/11/2016</a:t>
             </a:fld>
             <a:endParaRPr lang="en-US" dirty="0"/>
           </a:p>
@@ -2414,7 +2638,7 @@
           <a:p>
             <a:fld id="{CC1341B9-C675-4BEE-89AB-10FADA636FB9}" type="datetimeFigureOut">
               <a:rPr lang="en-US" smtClean="0"/>
-              <a:t>12/6/2016</a:t>
+              <a:t>12/11/2016</a:t>
             </a:fld>
             <a:endParaRPr lang="en-US" dirty="0"/>
           </a:p>
@@ -2594,7 +2818,7 @@
           <a:p>
             <a:fld id="{CC1341B9-C675-4BEE-89AB-10FADA636FB9}" type="datetimeFigureOut">
               <a:rPr lang="en-US" smtClean="0"/>
-              <a:t>12/6/2016</a:t>
+              <a:t>12/11/2016</a:t>
             </a:fld>
             <a:endParaRPr lang="en-US" dirty="0"/>
           </a:p>
@@ -2764,7 +2988,7 @@
           <a:p>
             <a:fld id="{CC1341B9-C675-4BEE-89AB-10FADA636FB9}" type="datetimeFigureOut">
               <a:rPr lang="en-US" smtClean="0"/>
-              <a:t>12/6/2016</a:t>
+              <a:t>12/11/2016</a:t>
             </a:fld>
             <a:endParaRPr lang="en-US" dirty="0"/>
           </a:p>
@@ -3010,7 +3234,7 @@
           <a:p>
             <a:fld id="{CC1341B9-C675-4BEE-89AB-10FADA636FB9}" type="datetimeFigureOut">
               <a:rPr lang="en-US" smtClean="0"/>
-              <a:t>12/6/2016</a:t>
+              <a:t>12/11/2016</a:t>
             </a:fld>
             <a:endParaRPr lang="en-US" dirty="0"/>
           </a:p>
@@ -3298,7 +3522,7 @@
           <a:p>
             <a:fld id="{CC1341B9-C675-4BEE-89AB-10FADA636FB9}" type="datetimeFigureOut">
               <a:rPr lang="en-US" smtClean="0"/>
-              <a:t>12/6/2016</a:t>
+              <a:t>12/11/2016</a:t>
             </a:fld>
             <a:endParaRPr lang="en-US" dirty="0"/>
           </a:p>
@@ -3720,7 +3944,7 @@
           <a:p>
             <a:fld id="{CC1341B9-C675-4BEE-89AB-10FADA636FB9}" type="datetimeFigureOut">
               <a:rPr lang="en-US" smtClean="0"/>
-              <a:t>12/6/2016</a:t>
+              <a:t>12/11/2016</a:t>
             </a:fld>
             <a:endParaRPr lang="en-US" dirty="0"/>
           </a:p>
@@ -3838,7 +4062,7 @@
           <a:p>
             <a:fld id="{CC1341B9-C675-4BEE-89AB-10FADA636FB9}" type="datetimeFigureOut">
               <a:rPr lang="en-US" smtClean="0"/>
-              <a:t>12/6/2016</a:t>
+              <a:t>12/11/2016</a:t>
             </a:fld>
             <a:endParaRPr lang="en-US" dirty="0"/>
           </a:p>
@@ -3933,7 +4157,7 @@
           <a:p>
             <a:fld id="{CC1341B9-C675-4BEE-89AB-10FADA636FB9}" type="datetimeFigureOut">
               <a:rPr lang="en-US" smtClean="0"/>
-              <a:t>12/6/2016</a:t>
+              <a:t>12/11/2016</a:t>
             </a:fld>
             <a:endParaRPr lang="en-US" dirty="0"/>
           </a:p>
@@ -4210,7 +4434,7 @@
           <a:p>
             <a:fld id="{CC1341B9-C675-4BEE-89AB-10FADA636FB9}" type="datetimeFigureOut">
               <a:rPr lang="en-US" smtClean="0"/>
-              <a:t>12/6/2016</a:t>
+              <a:t>12/11/2016</a:t>
             </a:fld>
             <a:endParaRPr lang="en-US" dirty="0"/>
           </a:p>
@@ -4463,7 +4687,7 @@
           <a:p>
             <a:fld id="{CC1341B9-C675-4BEE-89AB-10FADA636FB9}" type="datetimeFigureOut">
               <a:rPr lang="en-US" smtClean="0"/>
-              <a:t>12/6/2016</a:t>
+              <a:t>12/11/2016</a:t>
             </a:fld>
             <a:endParaRPr lang="en-US" dirty="0"/>
           </a:p>
@@ -4676,7 +4900,7 @@
           <a:p>
             <a:fld id="{CC1341B9-C675-4BEE-89AB-10FADA636FB9}" type="datetimeFigureOut">
               <a:rPr lang="en-US" smtClean="0"/>
-              <a:t>12/6/2016</a:t>
+              <a:t>12/11/2016</a:t>
             </a:fld>
             <a:endParaRPr lang="en-US" dirty="0"/>
           </a:p>
@@ -5236,6 +5460,147 @@
             <p:ph type="title"/>
           </p:nvPr>
         </p:nvSpPr>
+        <p:spPr/>
+        <p:txBody>
+          <a:bodyPr>
+            <a:normAutofit fontScale="90000"/>
+          </a:bodyPr>
+          <a:lstStyle/>
+          <a:p>
+            <a:pPr algn="l"/>
+            <a:r>
+              <a:rPr lang="en-US" b="1" dirty="0"/>
+              <a:t>Compare Home Price Grouped by Targeted Zip Code</a:t>
+            </a:r>
+            <a:endParaRPr lang="en-US" dirty="0"/>
+          </a:p>
+        </p:txBody>
+      </p:sp>
+      <p:sp>
+        <p:nvSpPr>
+          <p:cNvPr id="3" name="Content Placeholder 2"/>
+          <p:cNvSpPr>
+            <a:spLocks noGrp="1"/>
+          </p:cNvSpPr>
+          <p:nvPr>
+            <p:ph idx="1"/>
+          </p:nvPr>
+        </p:nvSpPr>
+        <p:spPr>
+          <a:xfrm>
+            <a:off x="5257800" y="1981200"/>
+            <a:ext cx="3733800" cy="4525963"/>
+          </a:xfrm>
+        </p:spPr>
+        <p:txBody>
+          <a:bodyPr/>
+          <a:lstStyle/>
+          <a:p>
+            <a:r>
+              <a:rPr lang="en-US" b="1" dirty="0"/>
+              <a:t>Only the one bedroom group whose hot zip codes’ median price is higher than its cold zip codes'</a:t>
+            </a:r>
+            <a:endParaRPr lang="en-US" dirty="0"/>
+          </a:p>
+          <a:p>
+            <a:endParaRPr lang="en-US" dirty="0"/>
+          </a:p>
+        </p:txBody>
+      </p:sp>
+      <p:pic>
+        <p:nvPicPr>
+          <p:cNvPr id="1026" name="Picture 2"/>
+          <p:cNvPicPr>
+            <a:picLocks noChangeAspect="1" noChangeArrowheads="1"/>
+          </p:cNvPicPr>
+          <p:nvPr/>
+        </p:nvPicPr>
+        <p:blipFill>
+          <a:blip r:embed="rId2">
+            <a:extLst>
+              <a:ext uri="{28A0092B-C50C-407E-A947-70E740481C1C}">
+                <a14:useLocalDpi xmlns:a14="http://schemas.microsoft.com/office/drawing/2010/main" val="0"/>
+              </a:ext>
+            </a:extLst>
+          </a:blip>
+          <a:srcRect/>
+          <a:stretch>
+            <a:fillRect/>
+          </a:stretch>
+        </p:blipFill>
+        <p:spPr bwMode="auto">
+          <a:xfrm>
+            <a:off x="399422" y="1752600"/>
+            <a:ext cx="4629778" cy="4343400"/>
+          </a:xfrm>
+          <a:prstGeom prst="rect">
+            <a:avLst/>
+          </a:prstGeom>
+          <a:noFill/>
+          <a:ln>
+            <a:noFill/>
+          </a:ln>
+          <a:extLst>
+            <a:ext uri="{909E8E84-426E-40DD-AFC4-6F175D3DCCD1}">
+              <a14:hiddenFill xmlns:a14="http://schemas.microsoft.com/office/drawing/2010/main">
+                <a:solidFill>
+                  <a:schemeClr val="accent1"/>
+                </a:solidFill>
+              </a14:hiddenFill>
+            </a:ext>
+            <a:ext uri="{91240B29-F687-4F45-9708-019B960494DF}">
+              <a14:hiddenLine xmlns:a14="http://schemas.microsoft.com/office/drawing/2010/main" w="9525">
+                <a:solidFill>
+                  <a:schemeClr val="tx1"/>
+                </a:solidFill>
+                <a:miter lim="800000"/>
+                <a:headEnd/>
+                <a:tailEnd/>
+              </a14:hiddenLine>
+            </a:ext>
+          </a:extLst>
+        </p:spPr>
+      </p:pic>
+    </p:spTree>
+    <p:extLst>
+      <p:ext uri="{BB962C8B-B14F-4D97-AF65-F5344CB8AC3E}">
+        <p14:creationId xmlns:p14="http://schemas.microsoft.com/office/powerpoint/2010/main" val="2511135926"/>
+      </p:ext>
+    </p:extLst>
+  </p:cSld>
+  <p:clrMapOvr>
+    <a:masterClrMapping/>
+  </p:clrMapOvr>
+</p:sld>
+</file>
+
+<file path=ppt/slides/slide11.xml><?xml version="1.0" encoding="utf-8"?>
+<p:sld xmlns:a="http://schemas.openxmlformats.org/drawingml/2006/main" xmlns:r="http://schemas.openxmlformats.org/officeDocument/2006/relationships" xmlns:p="http://schemas.openxmlformats.org/presentationml/2006/main">
+  <p:cSld>
+    <p:spTree>
+      <p:nvGrpSpPr>
+        <p:cNvPr id="1" name=""/>
+        <p:cNvGrpSpPr/>
+        <p:nvPr/>
+      </p:nvGrpSpPr>
+      <p:grpSpPr>
+        <a:xfrm>
+          <a:off x="0" y="0"/>
+          <a:ext cx="0" cy="0"/>
+          <a:chOff x="0" y="0"/>
+          <a:chExt cx="0" cy="0"/>
+        </a:xfrm>
+      </p:grpSpPr>
+      <p:sp>
+        <p:nvSpPr>
+          <p:cNvPr id="2" name="Title 1"/>
+          <p:cNvSpPr>
+            <a:spLocks noGrp="1"/>
+          </p:cNvSpPr>
+          <p:nvPr>
+            <p:ph type="title"/>
+          </p:nvPr>
+        </p:nvSpPr>
         <p:spPr>
           <a:xfrm>
             <a:off x="457200" y="76200"/>
@@ -5251,7 +5616,15 @@
             <a:pPr algn="l"/>
             <a:r>
               <a:rPr lang="en-US" sz="3600" b="1" dirty="0"/>
-              <a:t>Comparing "Estimated Rent per Square Foot" between Hot and Cold Zip codes</a:t>
+              <a:t>Comparing "Estimated Rent per Square Foot" </a:t>
+            </a:r>
+            <a:r>
+              <a:rPr lang="en-US" sz="3600" b="1" dirty="0" smtClean="0"/>
+              <a:t>Between </a:t>
+            </a:r>
+            <a:r>
+              <a:rPr lang="en-US" sz="3600" b="1" dirty="0"/>
+              <a:t>Hot and Cold Zip codes</a:t>
             </a:r>
             <a:endParaRPr lang="en-US" sz="3600" dirty="0"/>
           </a:p>
@@ -5375,7 +5748,7 @@
 </p:sld>
 </file>
 
-<file path=ppt/slides/slide11.xml><?xml version="1.0" encoding="utf-8"?>
+<file path=ppt/slides/slide12.xml><?xml version="1.0" encoding="utf-8"?>
 <p:sld xmlns:a="http://schemas.openxmlformats.org/drawingml/2006/main" xmlns:r="http://schemas.openxmlformats.org/officeDocument/2006/relationships" xmlns:p="http://schemas.openxmlformats.org/presentationml/2006/main">
   <p:cSld>
     <p:spTree>
@@ -5402,7 +5775,12 @@
             <p:ph type="title"/>
           </p:nvPr>
         </p:nvSpPr>
-        <p:spPr/>
+        <p:spPr>
+          <a:xfrm>
+            <a:off x="533400" y="0"/>
+            <a:ext cx="8229600" cy="1143000"/>
+          </a:xfrm>
+        </p:spPr>
         <p:txBody>
           <a:bodyPr>
             <a:normAutofit fontScale="90000"/>
@@ -5428,14 +5806,14 @@
             <p:ph idx="1"/>
             <p:extLst>
               <p:ext uri="{D42A27DB-BD31-4B8C-83A1-F6EECF244321}">
-                <p14:modId xmlns:p14="http://schemas.microsoft.com/office/powerpoint/2010/main" val="3778519146"/>
+                <p14:modId xmlns:p14="http://schemas.microsoft.com/office/powerpoint/2010/main" val="561729908"/>
               </p:ext>
             </p:extLst>
           </p:nvPr>
         </p:nvGraphicFramePr>
         <p:xfrm>
-          <a:off x="58016" y="1600200"/>
-          <a:ext cx="3409950" cy="979044"/>
+          <a:off x="990600" y="1219200"/>
+          <a:ext cx="3505200" cy="1151385"/>
         </p:xfrm>
         <a:graphic>
           <a:graphicData uri="http://schemas.openxmlformats.org/drawingml/2006/table">
@@ -5444,10 +5822,10 @@
                 <a:tableStyleId>{5C22544A-7EE6-4342-B048-85BDC9FD1C3A}</a:tableStyleId>
               </a:tblPr>
               <a:tblGrid>
-                <a:gridCol w="1365974"/>
-                <a:gridCol w="2043976"/>
+                <a:gridCol w="1404130"/>
+                <a:gridCol w="2101070"/>
               </a:tblGrid>
-              <a:tr h="326348">
+              <a:tr h="383795">
                 <a:tc>
                   <a:txBody>
                     <a:bodyPr/>
@@ -5523,7 +5901,7 @@
                   <a:tcPr marL="38100" marR="38100" marT="38100" marB="38100" anchor="ctr"/>
                 </a:tc>
               </a:tr>
-              <a:tr h="326348">
+              <a:tr h="383795">
                 <a:tc>
                   <a:txBody>
                     <a:bodyPr/>
@@ -5599,7 +5977,7 @@
                   <a:tcPr marL="38100" marR="38100" marT="38100" marB="38100" anchor="ctr"/>
                 </a:tc>
               </a:tr>
-              <a:tr h="326348">
+              <a:tr h="383795">
                 <a:tc>
                   <a:txBody>
                     <a:bodyPr/>
@@ -5702,8 +6080,8 @@
         </p:blipFill>
         <p:spPr bwMode="auto">
           <a:xfrm>
-            <a:off x="2715042" y="2286000"/>
-            <a:ext cx="6456667" cy="4523510"/>
+            <a:off x="381000" y="2480402"/>
+            <a:ext cx="5378282" cy="3767998"/>
           </a:xfrm>
           <a:prstGeom prst="rect">
             <a:avLst/>
@@ -5753,8 +6131,8 @@
         </p:nvSpPr>
         <p:spPr>
           <a:xfrm>
-            <a:off x="76200" y="3581400"/>
-            <a:ext cx="2671156" cy="1472894"/>
+            <a:off x="5791200" y="3276600"/>
+            <a:ext cx="3248526" cy="1472894"/>
           </a:xfrm>
           <a:prstGeom prst="rect">
             <a:avLst/>
@@ -5932,7 +6310,7 @@
 </p:sld>
 </file>
 
-<file path=ppt/slides/slide12.xml><?xml version="1.0" encoding="utf-8"?>
+<file path=ppt/slides/slide13.xml><?xml version="1.0" encoding="utf-8"?>
 <p:sld xmlns:a="http://schemas.openxmlformats.org/drawingml/2006/main" xmlns:r="http://schemas.openxmlformats.org/officeDocument/2006/relationships" xmlns:p="http://schemas.openxmlformats.org/presentationml/2006/main">
   <p:cSld>
     <p:spTree>
@@ -5959,7 +6337,12 @@
             <p:ph type="title"/>
           </p:nvPr>
         </p:nvSpPr>
-        <p:spPr/>
+        <p:spPr>
+          <a:xfrm>
+            <a:off x="457200" y="76200"/>
+            <a:ext cx="8229600" cy="1143000"/>
+          </a:xfrm>
+        </p:spPr>
         <p:txBody>
           <a:bodyPr>
             <a:normAutofit fontScale="90000"/>
@@ -5985,13 +6368,13 @@
             <p:ph idx="1"/>
             <p:extLst>
               <p:ext uri="{D42A27DB-BD31-4B8C-83A1-F6EECF244321}">
-                <p14:modId xmlns:p14="http://schemas.microsoft.com/office/powerpoint/2010/main" val="3246898872"/>
+                <p14:modId xmlns:p14="http://schemas.microsoft.com/office/powerpoint/2010/main" val="3447983441"/>
               </p:ext>
             </p:extLst>
           </p:nvPr>
         </p:nvGraphicFramePr>
         <p:xfrm>
-          <a:off x="228600" y="1524000"/>
+          <a:off x="990600" y="1219200"/>
           <a:ext cx="4267200" cy="1528487"/>
         </p:xfrm>
         <a:graphic>
@@ -6855,8 +7238,8 @@
         </p:blipFill>
         <p:spPr bwMode="auto">
           <a:xfrm>
-            <a:off x="2971800" y="2759798"/>
-            <a:ext cx="6051550" cy="4098202"/>
+            <a:off x="533400" y="2590800"/>
+            <a:ext cx="5670550" cy="3840183"/>
           </a:xfrm>
           <a:prstGeom prst="rect">
             <a:avLst/>
@@ -6906,7 +7289,7 @@
         </p:nvSpPr>
         <p:spPr>
           <a:xfrm>
-            <a:off x="236913" y="3460317"/>
+            <a:off x="6400800" y="3436254"/>
             <a:ext cx="2743200" cy="2697163"/>
           </a:xfrm>
           <a:prstGeom prst="rect">
@@ -7083,7 +7466,7 @@
 </p:sld>
 </file>
 
-<file path=ppt/slides/slide13.xml><?xml version="1.0" encoding="utf-8"?>
+<file path=ppt/slides/slide14.xml><?xml version="1.0" encoding="utf-8"?>
 <p:sld xmlns:a="http://schemas.openxmlformats.org/drawingml/2006/main" xmlns:r="http://schemas.openxmlformats.org/officeDocument/2006/relationships" xmlns:p="http://schemas.openxmlformats.org/presentationml/2006/main">
   <p:cSld>
     <p:spTree>
@@ -7118,16 +7501,23 @@
         </p:spPr>
         <p:txBody>
           <a:bodyPr>
-            <a:normAutofit fontScale="90000"/>
+            <a:normAutofit/>
           </a:bodyPr>
           <a:lstStyle/>
           <a:p>
-            <a:pPr algn="l"/>
-            <a:r>
-              <a:rPr lang="en-US" b="1" dirty="0"/>
-              <a:t>Geographic Location of the Zip Codes</a:t>
-            </a:r>
-            <a:endParaRPr lang="en-US" dirty="0"/>
+            <a:r>
+              <a:rPr lang="en-US" dirty="0" smtClean="0"/>
+              <a:t>“Top </a:t>
+            </a:r>
+            <a:r>
+              <a:rPr lang="en-US" dirty="0"/>
+              <a:t>30 hot zip codes in </a:t>
+            </a:r>
+            <a:r>
+              <a:rPr lang="en-US" dirty="0" smtClean="0"/>
+              <a:t>California”</a:t>
+            </a:r>
+            <a:endParaRPr lang="en-US" b="1" dirty="0"/>
           </a:p>
         </p:txBody>
       </p:sp>
@@ -7143,47 +7533,33 @@
         </p:nvSpPr>
         <p:spPr>
           <a:xfrm>
-            <a:off x="457200" y="990600"/>
+            <a:off x="5029200" y="914400"/>
             <a:ext cx="3733800" cy="5541962"/>
           </a:xfrm>
         </p:spPr>
         <p:txBody>
           <a:bodyPr>
-            <a:normAutofit fontScale="92500" lnSpcReduction="20000"/>
+            <a:normAutofit lnSpcReduction="10000"/>
           </a:bodyPr>
           <a:lstStyle/>
           <a:p>
             <a:r>
               <a:rPr lang="en-US" dirty="0" smtClean="0"/>
-              <a:t>Top </a:t>
+              <a:t>Spread </a:t>
+            </a:r>
+            <a:r>
+              <a:rPr lang="en-US" dirty="0" smtClean="0"/>
+              <a:t>all </a:t>
             </a:r>
             <a:r>
               <a:rPr lang="en-US" dirty="0"/>
-              <a:t>30 </a:t>
+              <a:t>over the </a:t>
             </a:r>
             <a:r>
               <a:rPr lang="en-US" dirty="0" smtClean="0"/>
-              <a:t>hot zip </a:t>
-            </a:r>
-            <a:r>
-              <a:rPr lang="en-US" dirty="0"/>
-              <a:t>codes </a:t>
-            </a:r>
-            <a:r>
-              <a:rPr lang="en-US" dirty="0" smtClean="0"/>
-              <a:t>in California</a:t>
-            </a:r>
-            <a:endParaRPr lang="en-US" b="1" dirty="0" smtClean="0"/>
-          </a:p>
-          <a:p>
-            <a:r>
-              <a:rPr lang="en-US" dirty="0" smtClean="0"/>
-              <a:t>Spread all </a:t>
-            </a:r>
-            <a:r>
-              <a:rPr lang="en-US" dirty="0"/>
-              <a:t>over the entire California</a:t>
-            </a:r>
+              <a:t>entirety California</a:t>
+            </a:r>
+            <a:endParaRPr lang="en-US" dirty="0"/>
           </a:p>
           <a:p>
             <a:r>
@@ -7232,7 +7608,7 @@
         </p:blipFill>
         <p:spPr bwMode="auto">
           <a:xfrm>
-            <a:off x="4483100" y="961650"/>
+            <a:off x="609600" y="838200"/>
             <a:ext cx="4203700" cy="5591550"/>
           </a:xfrm>
           <a:prstGeom prst="rect">
@@ -7293,151 +7669,6 @@
 </p:sld>
 </file>
 
-<file path=ppt/slides/slide14.xml><?xml version="1.0" encoding="utf-8"?>
-<p:sld xmlns:a="http://schemas.openxmlformats.org/drawingml/2006/main" xmlns:r="http://schemas.openxmlformats.org/officeDocument/2006/relationships" xmlns:p="http://schemas.openxmlformats.org/presentationml/2006/main">
-  <p:cSld>
-    <p:spTree>
-      <p:nvGrpSpPr>
-        <p:cNvPr id="1" name=""/>
-        <p:cNvGrpSpPr/>
-        <p:nvPr/>
-      </p:nvGrpSpPr>
-      <p:grpSpPr>
-        <a:xfrm>
-          <a:off x="0" y="0"/>
-          <a:ext cx="0" cy="0"/>
-          <a:chOff x="0" y="0"/>
-          <a:chExt cx="0" cy="0"/>
-        </a:xfrm>
-      </p:grpSpPr>
-      <p:sp>
-        <p:nvSpPr>
-          <p:cNvPr id="2" name="Title 1"/>
-          <p:cNvSpPr>
-            <a:spLocks noGrp="1"/>
-          </p:cNvSpPr>
-          <p:nvPr>
-            <p:ph type="title"/>
-          </p:nvPr>
-        </p:nvSpPr>
-        <p:spPr/>
-        <p:txBody>
-          <a:bodyPr>
-            <a:normAutofit fontScale="90000"/>
-          </a:bodyPr>
-          <a:lstStyle/>
-          <a:p>
-            <a:pPr algn="l"/>
-            <a:r>
-              <a:rPr lang="en-US" b="1" dirty="0"/>
-              <a:t>Building a Model to Predict Hot/Cold Zip </a:t>
-            </a:r>
-            <a:r>
-              <a:rPr lang="en-US" b="1" dirty="0" smtClean="0"/>
-              <a:t>Codes</a:t>
-            </a:r>
-            <a:endParaRPr lang="en-US" dirty="0"/>
-          </a:p>
-        </p:txBody>
-      </p:sp>
-      <p:sp>
-        <p:nvSpPr>
-          <p:cNvPr id="3" name="Content Placeholder 2"/>
-          <p:cNvSpPr>
-            <a:spLocks noGrp="1"/>
-          </p:cNvSpPr>
-          <p:nvPr>
-            <p:ph idx="1"/>
-          </p:nvPr>
-        </p:nvSpPr>
-        <p:spPr>
-          <a:xfrm>
-            <a:off x="457200" y="1752600"/>
-            <a:ext cx="8229600" cy="4525963"/>
-          </a:xfrm>
-        </p:spPr>
-        <p:txBody>
-          <a:bodyPr/>
-          <a:lstStyle/>
-          <a:p>
-            <a:r>
-              <a:rPr lang="en-US" dirty="0"/>
-              <a:t>Generate Balanced </a:t>
-            </a:r>
-            <a:r>
-              <a:rPr lang="en-US" dirty="0" smtClean="0"/>
-              <a:t>Dataset</a:t>
-            </a:r>
-          </a:p>
-          <a:p>
-            <a:pPr lvl="1"/>
-            <a:r>
-              <a:rPr lang="en-US" dirty="0" smtClean="0"/>
-              <a:t>10000 </a:t>
-            </a:r>
-            <a:r>
-              <a:rPr lang="en-US" dirty="0"/>
-              <a:t>samples with replacement from each of the hot and cold zip </a:t>
-            </a:r>
-            <a:r>
-              <a:rPr lang="en-US" dirty="0" smtClean="0"/>
-              <a:t>code</a:t>
-            </a:r>
-          </a:p>
-          <a:p>
-            <a:pPr lvl="1"/>
-            <a:r>
-              <a:rPr lang="en-US" dirty="0" smtClean="0"/>
-              <a:t>combine them </a:t>
-            </a:r>
-            <a:r>
-              <a:rPr lang="en-US" dirty="0"/>
-              <a:t>to generate a 20000 row </a:t>
-            </a:r>
-            <a:r>
-              <a:rPr lang="en-US" dirty="0" smtClean="0"/>
-              <a:t>dataset</a:t>
-            </a:r>
-          </a:p>
-          <a:p>
-            <a:r>
-              <a:rPr lang="en-US" dirty="0"/>
-              <a:t>Splitting Training and Testing </a:t>
-            </a:r>
-            <a:r>
-              <a:rPr lang="en-US" dirty="0" smtClean="0"/>
-              <a:t>Dataset</a:t>
-            </a:r>
-          </a:p>
-          <a:p>
-            <a:pPr lvl="1"/>
-            <a:r>
-              <a:rPr lang="en-US" dirty="0"/>
-              <a:t>80% training set and 20% testing set</a:t>
-            </a:r>
-          </a:p>
-        </p:txBody>
-      </p:sp>
-    </p:spTree>
-    <p:extLst>
-      <p:ext uri="{BB962C8B-B14F-4D97-AF65-F5344CB8AC3E}">
-        <p14:creationId xmlns:p14="http://schemas.microsoft.com/office/powerpoint/2010/main" val="9890837"/>
-      </p:ext>
-    </p:extLst>
-  </p:cSld>
-  <p:clrMapOvr>
-    <a:masterClrMapping/>
-  </p:clrMapOvr>
-  <p:timing>
-    <p:tnLst>
-      <p:par>
-        <p:cTn id="1" dur="indefinite" restart="never" nodeType="tmRoot"/>
-      </p:par>
-    </p:tnLst>
-  </p:timing>
-</p:sld>
-</file>
-
 <file path=ppt/slides/slide15.xml><?xml version="1.0" encoding="utf-8"?>
 <p:sld xmlns:a="http://schemas.openxmlformats.org/drawingml/2006/main" xmlns:r="http://schemas.openxmlformats.org/officeDocument/2006/relationships" xmlns:p="http://schemas.openxmlformats.org/presentationml/2006/main">
   <p:cSld>
@@ -7475,7 +7706,11 @@
             <a:pPr algn="l"/>
             <a:r>
               <a:rPr lang="en-US" b="1" dirty="0"/>
-              <a:t>Logistic Regression Training and Evaluation</a:t>
+              <a:t>Building a Model to Predict Hot/Cold Zip </a:t>
+            </a:r>
+            <a:r>
+              <a:rPr lang="en-US" b="1" dirty="0" smtClean="0"/>
+              <a:t>Codes</a:t>
             </a:r>
             <a:endParaRPr lang="en-US" dirty="0"/>
           </a:p>
@@ -7493,68 +7728,103 @@
         </p:nvSpPr>
         <p:spPr>
           <a:xfrm>
-            <a:off x="228600" y="1866900"/>
-            <a:ext cx="3273989" cy="4495799"/>
+            <a:off x="609600" y="1752600"/>
+            <a:ext cx="8229600" cy="4525963"/>
           </a:xfrm>
         </p:spPr>
         <p:txBody>
-          <a:bodyPr>
-            <a:normAutofit fontScale="92500"/>
-          </a:bodyPr>
+          <a:bodyPr/>
           <a:lstStyle/>
           <a:p>
             <a:r>
+              <a:rPr lang="en-US" dirty="0"/>
+              <a:t>Generate Balanced </a:t>
+            </a:r>
+            <a:r>
               <a:rPr lang="en-US" dirty="0" smtClean="0"/>
-              <a:t>hyperparameter </a:t>
+              <a:t>Dataset</a:t>
+            </a:r>
+          </a:p>
+          <a:p>
+            <a:pPr lvl="1"/>
+            <a:r>
+              <a:rPr lang="en-US" dirty="0" smtClean="0"/>
+              <a:t>10,000 </a:t>
             </a:r>
             <a:r>
               <a:rPr lang="en-US" dirty="0"/>
-              <a:t>C being 1000 seems to generate the best performance with precision mean equal to 0.71063 and ROC mean of 0.79909. </a:t>
+              <a:t>samples with replacement from each of the hot and cold zip </a:t>
+            </a:r>
+            <a:r>
+              <a:rPr lang="en-US" dirty="0" smtClean="0"/>
+              <a:t>code</a:t>
+            </a:r>
+          </a:p>
+          <a:p>
+            <a:pPr lvl="1"/>
+            <a:r>
+              <a:rPr lang="en-US" dirty="0"/>
+              <a:t>C</a:t>
+            </a:r>
+            <a:r>
+              <a:rPr lang="en-US" dirty="0" smtClean="0"/>
+              <a:t>ombine </a:t>
+            </a:r>
+            <a:r>
+              <a:rPr lang="en-US" dirty="0" smtClean="0"/>
+              <a:t>them </a:t>
+            </a:r>
+            <a:r>
+              <a:rPr lang="en-US" dirty="0"/>
+              <a:t>to generate a </a:t>
+            </a:r>
+            <a:r>
+              <a:rPr lang="en-US" dirty="0" smtClean="0"/>
+              <a:t>20,000 </a:t>
+            </a:r>
+            <a:r>
+              <a:rPr lang="en-US" dirty="0"/>
+              <a:t>row </a:t>
+            </a:r>
+            <a:r>
+              <a:rPr lang="en-US" dirty="0" smtClean="0"/>
+              <a:t>dataset</a:t>
+            </a:r>
+          </a:p>
+          <a:p>
+            <a:r>
+              <a:rPr lang="en-US" dirty="0"/>
+              <a:t>Splitting Training and Testing </a:t>
+            </a:r>
+            <a:r>
+              <a:rPr lang="en-US" dirty="0" smtClean="0"/>
+              <a:t>Dataset</a:t>
+            </a:r>
+          </a:p>
+          <a:p>
+            <a:pPr lvl="1"/>
+            <a:r>
+              <a:rPr lang="en-US" dirty="0"/>
+              <a:t>80% training </a:t>
+            </a:r>
+            <a:r>
+              <a:rPr lang="en-US" dirty="0" smtClean="0"/>
+              <a:t>set</a:t>
+            </a:r>
+          </a:p>
+          <a:p>
+            <a:pPr lvl="1"/>
+            <a:r>
+              <a:rPr lang="en-US" dirty="0" smtClean="0"/>
+              <a:t>20</a:t>
+            </a:r>
+            <a:r>
+              <a:rPr lang="en-US" dirty="0"/>
+              <a:t>% testing set</a:t>
             </a:r>
           </a:p>
         </p:txBody>
       </p:sp>
-      <p:pic>
-        <p:nvPicPr>
-          <p:cNvPr id="1026" name="Picture 2" descr="https://lh4.googleusercontent.com/rg8w0ch_6-PGj7M7FgIZ7avz8gsZ0UfJYtdF1Qu27zS2Z9m0pHCSfvgVQg13VusZMGSmoZdZcQL7WKsw7JjU0CEaynEGclE8avRn9zZ4u76hiyxjc84Jou0TkhotsroZ3f9KD4pM"/>
-          <p:cNvPicPr>
-            <a:picLocks noChangeAspect="1" noChangeArrowheads="1"/>
-          </p:cNvPicPr>
-          <p:nvPr/>
-        </p:nvPicPr>
-        <p:blipFill>
-          <a:blip r:embed="rId2">
-            <a:extLst>
-              <a:ext uri="{28A0092B-C50C-407E-A947-70E740481C1C}">
-                <a14:useLocalDpi xmlns:a14="http://schemas.microsoft.com/office/drawing/2010/main" val="0"/>
-              </a:ext>
-            </a:extLst>
-          </a:blip>
-          <a:srcRect/>
-          <a:stretch>
-            <a:fillRect/>
-          </a:stretch>
-        </p:blipFill>
-        <p:spPr bwMode="auto">
-          <a:xfrm>
-            <a:off x="3505200" y="2015367"/>
-            <a:ext cx="5562600" cy="4080633"/>
-          </a:xfrm>
-          <a:prstGeom prst="rect">
-            <a:avLst/>
-          </a:prstGeom>
-          <a:noFill/>
-          <a:extLst>
-            <a:ext uri="{909E8E84-426E-40DD-AFC4-6F175D3DCCD1}">
-              <a14:hiddenFill xmlns:a14="http://schemas.microsoft.com/office/drawing/2010/main">
-                <a:solidFill>
-                  <a:srgbClr val="FFFFFF"/>
-                </a:solidFill>
-              </a14:hiddenFill>
-            </a:ext>
-          </a:extLst>
-        </p:spPr>
-      </p:pic>
     </p:spTree>
     <p:extLst>
       <p:ext uri="{BB962C8B-B14F-4D97-AF65-F5344CB8AC3E}">
@@ -7612,6 +7882,165 @@
             <a:pPr algn="l"/>
             <a:r>
               <a:rPr lang="en-US" b="1" dirty="0"/>
+              <a:t>Logistic Regression Training and Evaluation</a:t>
+            </a:r>
+            <a:endParaRPr lang="en-US" dirty="0"/>
+          </a:p>
+        </p:txBody>
+      </p:sp>
+      <p:sp>
+        <p:nvSpPr>
+          <p:cNvPr id="3" name="Content Placeholder 2"/>
+          <p:cNvSpPr>
+            <a:spLocks noGrp="1"/>
+          </p:cNvSpPr>
+          <p:nvPr>
+            <p:ph idx="1"/>
+          </p:nvPr>
+        </p:nvSpPr>
+        <p:spPr>
+          <a:xfrm>
+            <a:off x="5793811" y="2743201"/>
+            <a:ext cx="3350189" cy="4495799"/>
+          </a:xfrm>
+        </p:spPr>
+        <p:txBody>
+          <a:bodyPr>
+            <a:normAutofit/>
+          </a:bodyPr>
+          <a:lstStyle/>
+          <a:p>
+            <a:r>
+              <a:rPr lang="en-US" sz="2800" dirty="0" smtClean="0"/>
+              <a:t>C =1000 best by grid search</a:t>
+            </a:r>
+          </a:p>
+          <a:p>
+            <a:r>
+              <a:rPr lang="en-US" sz="2800" dirty="0" smtClean="0"/>
+              <a:t>Precision = 0.71063 </a:t>
+            </a:r>
+          </a:p>
+          <a:p>
+            <a:r>
+              <a:rPr lang="en-US" sz="2800" dirty="0" smtClean="0"/>
+              <a:t>ROC Ave = 0.79909</a:t>
+            </a:r>
+            <a:endParaRPr lang="en-US" sz="2800" dirty="0"/>
+          </a:p>
+        </p:txBody>
+      </p:sp>
+      <p:pic>
+        <p:nvPicPr>
+          <p:cNvPr id="2050" name="Picture 2"/>
+          <p:cNvPicPr>
+            <a:picLocks noChangeAspect="1" noChangeArrowheads="1"/>
+          </p:cNvPicPr>
+          <p:nvPr/>
+        </p:nvPicPr>
+        <p:blipFill>
+          <a:blip r:embed="rId2">
+            <a:extLst>
+              <a:ext uri="{28A0092B-C50C-407E-A947-70E740481C1C}">
+                <a14:useLocalDpi xmlns:a14="http://schemas.microsoft.com/office/drawing/2010/main" val="0"/>
+              </a:ext>
+            </a:extLst>
+          </a:blip>
+          <a:srcRect/>
+          <a:stretch>
+            <a:fillRect/>
+          </a:stretch>
+        </p:blipFill>
+        <p:spPr bwMode="auto">
+          <a:xfrm>
+            <a:off x="0" y="1794961"/>
+            <a:ext cx="5810667" cy="4224839"/>
+          </a:xfrm>
+          <a:prstGeom prst="rect">
+            <a:avLst/>
+          </a:prstGeom>
+          <a:noFill/>
+          <a:ln>
+            <a:noFill/>
+          </a:ln>
+          <a:extLst>
+            <a:ext uri="{909E8E84-426E-40DD-AFC4-6F175D3DCCD1}">
+              <a14:hiddenFill xmlns:a14="http://schemas.microsoft.com/office/drawing/2010/main">
+                <a:solidFill>
+                  <a:schemeClr val="accent1"/>
+                </a:solidFill>
+              </a14:hiddenFill>
+            </a:ext>
+            <a:ext uri="{91240B29-F687-4F45-9708-019B960494DF}">
+              <a14:hiddenLine xmlns:a14="http://schemas.microsoft.com/office/drawing/2010/main" w="9525">
+                <a:solidFill>
+                  <a:schemeClr val="tx1"/>
+                </a:solidFill>
+                <a:miter lim="800000"/>
+                <a:headEnd/>
+                <a:tailEnd/>
+              </a14:hiddenLine>
+            </a:ext>
+          </a:extLst>
+        </p:spPr>
+      </p:pic>
+    </p:spTree>
+    <p:extLst>
+      <p:ext uri="{BB962C8B-B14F-4D97-AF65-F5344CB8AC3E}">
+        <p14:creationId xmlns:p14="http://schemas.microsoft.com/office/powerpoint/2010/main" val="9890837"/>
+      </p:ext>
+    </p:extLst>
+  </p:cSld>
+  <p:clrMapOvr>
+    <a:masterClrMapping/>
+  </p:clrMapOvr>
+  <p:timing>
+    <p:tnLst>
+      <p:par>
+        <p:cTn id="1" dur="indefinite" restart="never" nodeType="tmRoot"/>
+      </p:par>
+    </p:tnLst>
+  </p:timing>
+</p:sld>
+</file>
+
+<file path=ppt/slides/slide17.xml><?xml version="1.0" encoding="utf-8"?>
+<p:sld xmlns:a="http://schemas.openxmlformats.org/drawingml/2006/main" xmlns:r="http://schemas.openxmlformats.org/officeDocument/2006/relationships" xmlns:p="http://schemas.openxmlformats.org/presentationml/2006/main">
+  <p:cSld>
+    <p:spTree>
+      <p:nvGrpSpPr>
+        <p:cNvPr id="1" name=""/>
+        <p:cNvGrpSpPr/>
+        <p:nvPr/>
+      </p:nvGrpSpPr>
+      <p:grpSpPr>
+        <a:xfrm>
+          <a:off x="0" y="0"/>
+          <a:ext cx="0" cy="0"/>
+          <a:chOff x="0" y="0"/>
+          <a:chExt cx="0" cy="0"/>
+        </a:xfrm>
+      </p:grpSpPr>
+      <p:sp>
+        <p:nvSpPr>
+          <p:cNvPr id="2" name="Title 1"/>
+          <p:cNvSpPr>
+            <a:spLocks noGrp="1"/>
+          </p:cNvSpPr>
+          <p:nvPr>
+            <p:ph type="title"/>
+          </p:nvPr>
+        </p:nvSpPr>
+        <p:spPr/>
+        <p:txBody>
+          <a:bodyPr>
+            <a:normAutofit fontScale="90000"/>
+          </a:bodyPr>
+          <a:lstStyle/>
+          <a:p>
+            <a:pPr algn="l"/>
+            <a:r>
+              <a:rPr lang="en-US" b="1" dirty="0"/>
               <a:t>Support Vector Classifier Training and Evaluation</a:t>
             </a:r>
             <a:endParaRPr lang="en-US" dirty="0"/>
@@ -7641,19 +8070,80 @@
           <a:lstStyle/>
           <a:p>
             <a:r>
+              <a:rPr lang="en-US" sz="2400" dirty="0" smtClean="0"/>
+              <a:t>Best </a:t>
+            </a:r>
+            <a:r>
               <a:rPr lang="en-US" sz="2400" dirty="0"/>
-              <a:t>The default Radial Basis function (RBF) kernel seemed to work the </a:t>
+              <a:t>H</a:t>
             </a:r>
             <a:r>
               <a:rPr lang="en-US" sz="2400" dirty="0" smtClean="0"/>
-              <a:t>best</a:t>
-            </a:r>
-          </a:p>
-          <a:p>
+              <a:t>yper </a:t>
+            </a:r>
+            <a:r>
+              <a:rPr lang="en-US" sz="2400" dirty="0" smtClean="0"/>
+              <a:t>P</a:t>
+            </a:r>
+            <a:r>
+              <a:rPr lang="en-US" sz="2400" dirty="0" smtClean="0"/>
+              <a:t>arameters</a:t>
+            </a:r>
+            <a:r>
+              <a:rPr lang="en-US" sz="2400" dirty="0" smtClean="0"/>
+              <a:t>:</a:t>
+            </a:r>
+          </a:p>
+          <a:p>
+            <a:pPr lvl="1"/>
+            <a:r>
+              <a:rPr lang="en-US" sz="2000" dirty="0" smtClean="0"/>
+              <a:t>C=1</a:t>
+            </a:r>
+          </a:p>
+          <a:p>
+            <a:pPr lvl="1"/>
+            <a:r>
+              <a:rPr lang="en-US" sz="2000" dirty="0" smtClean="0"/>
+              <a:t>principal component=1</a:t>
+            </a:r>
+          </a:p>
+          <a:p>
+            <a:pPr lvl="1"/>
+            <a:r>
+              <a:rPr lang="en-US" sz="2000" dirty="0" smtClean="0"/>
+              <a:t>kernel=RBF</a:t>
+            </a:r>
+          </a:p>
+          <a:p>
+            <a:pPr lvl="1"/>
+            <a:r>
+              <a:rPr lang="en-US" sz="2000" dirty="0" smtClean="0"/>
+              <a:t>original </a:t>
+            </a:r>
+            <a:r>
+              <a:rPr lang="en-US" sz="2000" dirty="0"/>
+              <a:t>best </a:t>
+            </a:r>
+            <a:r>
+              <a:rPr lang="en-US" sz="2000" dirty="0" smtClean="0"/>
+              <a:t>feature=2</a:t>
+            </a:r>
+          </a:p>
+          <a:p>
+            <a:r>
+              <a:rPr lang="en-US" sz="2400" dirty="0" smtClean="0"/>
+              <a:t>Overall </a:t>
+            </a:r>
             <a:r>
               <a:rPr lang="en-US" sz="2400" dirty="0"/>
-              <a:t>the best hyperparameter I found is C=1, one principal component, RBF kernel and two original best feature after the cross validation on the training dataset.   The overall precision score I got after applying the model to the testing dataset is 0.96. </a:t>
-            </a:r>
+              <a:t>precision score </a:t>
+            </a:r>
+            <a:r>
+              <a:rPr lang="en-US" sz="2400" dirty="0" smtClean="0"/>
+              <a:t>= 0.96</a:t>
+            </a:r>
+            <a:endParaRPr lang="en-US" sz="2400" dirty="0"/>
           </a:p>
         </p:txBody>
       </p:sp>
@@ -7666,13 +8156,13 @@
           <p:nvPr>
             <p:extLst>
               <p:ext uri="{D42A27DB-BD31-4B8C-83A1-F6EECF244321}">
-                <p14:modId xmlns:p14="http://schemas.microsoft.com/office/powerpoint/2010/main" val="79784610"/>
+                <p14:modId xmlns:p14="http://schemas.microsoft.com/office/powerpoint/2010/main" val="2798584769"/>
               </p:ext>
             </p:extLst>
           </p:nvPr>
         </p:nvGraphicFramePr>
         <p:xfrm>
-          <a:off x="2133600" y="4191000"/>
+          <a:off x="1608221" y="4114800"/>
           <a:ext cx="5943600" cy="2312670"/>
         </p:xfrm>
         <a:graphic>
@@ -9165,272 +9655,10 @@
           </a:graphicData>
         </a:graphic>
       </p:graphicFrame>
-      <p:sp>
-        <p:nvSpPr>
-          <p:cNvPr id="6" name="Rectangle 1"/>
-          <p:cNvSpPr>
-            <a:spLocks noChangeArrowheads="1"/>
-          </p:cNvSpPr>
-          <p:nvPr/>
-        </p:nvSpPr>
-        <p:spPr bwMode="auto">
-          <a:xfrm>
-            <a:off x="1600200" y="2706688"/>
-            <a:ext cx="9144000" cy="457200"/>
-          </a:xfrm>
-          <a:prstGeom prst="rect">
-            <a:avLst/>
-          </a:prstGeom>
-          <a:noFill/>
-          <a:ln>
-            <a:noFill/>
-          </a:ln>
-          <a:effectLst/>
-          <a:extLst>
-            <a:ext uri="{909E8E84-426E-40DD-AFC4-6F175D3DCCD1}">
-              <a14:hiddenFill xmlns:a14="http://schemas.microsoft.com/office/drawing/2010/main">
-                <a:solidFill>
-                  <a:schemeClr val="accent1"/>
-                </a:solidFill>
-              </a14:hiddenFill>
-            </a:ext>
-            <a:ext uri="{91240B29-F687-4F45-9708-019B960494DF}">
-              <a14:hiddenLine xmlns:a14="http://schemas.microsoft.com/office/drawing/2010/main" w="9525">
-                <a:solidFill>
-                  <a:schemeClr val="tx1"/>
-                </a:solidFill>
-                <a:miter lim="800000"/>
-                <a:headEnd/>
-                <a:tailEnd/>
-              </a14:hiddenLine>
-            </a:ext>
-            <a:ext uri="{AF507438-7753-43E0-B8FC-AC1667EBCBE1}">
-              <a14:hiddenEffects xmlns:a14="http://schemas.microsoft.com/office/drawing/2010/main">
-                <a:effectLst>
-                  <a:outerShdw dist="35921" dir="2700000" algn="ctr" rotWithShape="0">
-                    <a:schemeClr val="bg2"/>
-                  </a:outerShdw>
-                </a:effectLst>
-              </a14:hiddenEffects>
-            </a:ext>
-          </a:extLst>
-        </p:spPr>
-        <p:txBody>
-          <a:bodyPr vert="horz" wrap="none" lIns="91440" tIns="45720" rIns="91440" bIns="45720" numCol="1" anchor="ctr" anchorCtr="0" compatLnSpc="1">
-            <a:prstTxWarp prst="textNoShape">
-              <a:avLst/>
-            </a:prstTxWarp>
-            <a:spAutoFit/>
-          </a:bodyPr>
-          <a:lstStyle/>
-          <a:p>
-            <a:pPr marL="0" marR="0" lvl="0" indent="0" algn="l" defTabSz="914400" rtl="0" eaLnBrk="1" fontAlgn="base" latinLnBrk="0" hangingPunct="1">
-              <a:lnSpc>
-                <a:spcPct val="100000"/>
-              </a:lnSpc>
-              <a:spcBef>
-                <a:spcPct val="0"/>
-              </a:spcBef>
-              <a:spcAft>
-                <a:spcPct val="0"/>
-              </a:spcAft>
-              <a:buClrTx/>
-              <a:buSzTx/>
-              <a:buFontTx/>
-              <a:buNone/>
-              <a:tabLst/>
-            </a:pPr>
-            <a:r>
-              <a:rPr kumimoji="0" lang="en-US" altLang="en-US" sz="1800" b="0" i="0" u="none" strike="noStrike" cap="none" normalizeH="0" baseline="0" dirty="0" smtClean="0">
-                <a:ln>
-                  <a:noFill/>
-                </a:ln>
-                <a:solidFill>
-                  <a:schemeClr val="tx1"/>
-                </a:solidFill>
-                <a:effectLst/>
-                <a:latin typeface="Arial" pitchFamily="34" charset="0"/>
-                <a:cs typeface="Arial" pitchFamily="34" charset="0"/>
-              </a:rPr>
-              <a:t/>
-            </a:r>
-            <a:br>
-              <a:rPr kumimoji="0" lang="en-US" altLang="en-US" sz="1800" b="0" i="0" u="none" strike="noStrike" cap="none" normalizeH="0" baseline="0" dirty="0" smtClean="0">
-                <a:ln>
-                  <a:noFill/>
-                </a:ln>
-                <a:solidFill>
-                  <a:schemeClr val="tx1"/>
-                </a:solidFill>
-                <a:effectLst/>
-                <a:latin typeface="Arial" pitchFamily="34" charset="0"/>
-                <a:cs typeface="Arial" pitchFamily="34" charset="0"/>
-              </a:rPr>
-            </a:br>
-            <a:endParaRPr kumimoji="0" lang="en-US" altLang="en-US" sz="1800" b="0" i="0" u="none" strike="noStrike" cap="none" normalizeH="0" baseline="0" dirty="0" smtClean="0">
-              <a:ln>
-                <a:noFill/>
-              </a:ln>
-              <a:solidFill>
-                <a:schemeClr val="tx1"/>
-              </a:solidFill>
-              <a:effectLst/>
-              <a:latin typeface="Arial" pitchFamily="34" charset="0"/>
-              <a:cs typeface="Arial" pitchFamily="34" charset="0"/>
-            </a:endParaRPr>
-          </a:p>
-          <a:p>
-            <a:pPr marL="0" marR="0" lvl="0" indent="0" algn="l" defTabSz="914400" rtl="0" eaLnBrk="0" fontAlgn="base" latinLnBrk="0" hangingPunct="0">
-              <a:lnSpc>
-                <a:spcPct val="100000"/>
-              </a:lnSpc>
-              <a:spcBef>
-                <a:spcPct val="0"/>
-              </a:spcBef>
-              <a:spcAft>
-                <a:spcPct val="0"/>
-              </a:spcAft>
-              <a:buClrTx/>
-              <a:buSzTx/>
-              <a:buFontTx/>
-              <a:buNone/>
-              <a:tabLst/>
-            </a:pPr>
-            <a:endParaRPr kumimoji="0" lang="en-US" altLang="en-US" sz="1800" b="0" i="0" u="none" strike="noStrike" cap="none" normalizeH="0" baseline="0" dirty="0" smtClean="0">
-              <a:ln>
-                <a:noFill/>
-              </a:ln>
-              <a:solidFill>
-                <a:schemeClr val="tx1"/>
-              </a:solidFill>
-              <a:effectLst/>
-              <a:latin typeface="Arial" pitchFamily="34" charset="0"/>
-              <a:cs typeface="Arial" pitchFamily="34" charset="0"/>
-            </a:endParaRPr>
-          </a:p>
-        </p:txBody>
-      </p:sp>
     </p:spTree>
     <p:extLst>
       <p:ext uri="{BB962C8B-B14F-4D97-AF65-F5344CB8AC3E}">
         <p14:creationId xmlns:p14="http://schemas.microsoft.com/office/powerpoint/2010/main" val="9890837"/>
-      </p:ext>
-    </p:extLst>
-  </p:cSld>
-  <p:clrMapOvr>
-    <a:masterClrMapping/>
-  </p:clrMapOvr>
-  <p:timing>
-    <p:tnLst>
-      <p:par>
-        <p:cTn id="1" dur="indefinite" restart="never" nodeType="tmRoot"/>
-      </p:par>
-    </p:tnLst>
-  </p:timing>
-</p:sld>
-</file>
-
-<file path=ppt/slides/slide17.xml><?xml version="1.0" encoding="utf-8"?>
-<p:sld xmlns:a="http://schemas.openxmlformats.org/drawingml/2006/main" xmlns:r="http://schemas.openxmlformats.org/officeDocument/2006/relationships" xmlns:p="http://schemas.openxmlformats.org/presentationml/2006/main">
-  <p:cSld>
-    <p:spTree>
-      <p:nvGrpSpPr>
-        <p:cNvPr id="1" name=""/>
-        <p:cNvGrpSpPr/>
-        <p:nvPr/>
-      </p:nvGrpSpPr>
-      <p:grpSpPr>
-        <a:xfrm>
-          <a:off x="0" y="0"/>
-          <a:ext cx="0" cy="0"/>
-          <a:chOff x="0" y="0"/>
-          <a:chExt cx="0" cy="0"/>
-        </a:xfrm>
-      </p:grpSpPr>
-      <p:sp>
-        <p:nvSpPr>
-          <p:cNvPr id="2" name="Title 1"/>
-          <p:cNvSpPr>
-            <a:spLocks noGrp="1"/>
-          </p:cNvSpPr>
-          <p:nvPr>
-            <p:ph type="title"/>
-          </p:nvPr>
-        </p:nvSpPr>
-        <p:spPr/>
-        <p:txBody>
-          <a:bodyPr>
-            <a:normAutofit/>
-          </a:bodyPr>
-          <a:lstStyle/>
-          <a:p>
-            <a:pPr algn="l"/>
-            <a:r>
-              <a:rPr lang="en-US" b="1" dirty="0"/>
-              <a:t>Overall Conclusion</a:t>
-            </a:r>
-            <a:endParaRPr lang="en-US" dirty="0"/>
-          </a:p>
-        </p:txBody>
-      </p:sp>
-      <p:sp>
-        <p:nvSpPr>
-          <p:cNvPr id="3" name="Content Placeholder 2"/>
-          <p:cNvSpPr>
-            <a:spLocks noGrp="1"/>
-          </p:cNvSpPr>
-          <p:nvPr>
-            <p:ph idx="1"/>
-          </p:nvPr>
-        </p:nvSpPr>
-        <p:spPr/>
-        <p:txBody>
-          <a:bodyPr>
-            <a:normAutofit fontScale="62500" lnSpcReduction="20000"/>
-          </a:bodyPr>
-          <a:lstStyle/>
-          <a:p>
-            <a:r>
-              <a:rPr lang="en-US" dirty="0"/>
-              <a:t>This analysis tried to use the US housing price data and the IRS data to help investors discover high potential California zip codes for purchasing rental properties.  Through the analysis, some unique characteristics of the high potential “hot” zip codes are identified; for example, “hot” zip codes are spread over Northern and Southern California.  Also, “hot” zip codes have slightly higher estimated rent per square foot as well as price-to-rent ratio although their adjusted gross income is lower than “cold” zip codes.  “Hot” zip codes generally have lower home price than “cold” zip codes for all numbers of bedroom home except those one bedroom homes</a:t>
-            </a:r>
-            <a:r>
-              <a:rPr lang="en-US" dirty="0" smtClean="0"/>
-              <a:t>.</a:t>
-            </a:r>
-            <a:endParaRPr lang="en-US" dirty="0"/>
-          </a:p>
-          <a:p>
-            <a:r>
-              <a:rPr lang="en-US" dirty="0"/>
-              <a:t>To develop a prediction model for “hot” zip codes, I tried two modeling algorithm of logistic regression and support vector classifier(SVC).  SVC turned out be a better algorithm.  The best SVC model delivered a </a:t>
-            </a:r>
-            <a:r>
-              <a:rPr lang="en-US" dirty="0" smtClean="0"/>
-              <a:t>96% </a:t>
-            </a:r>
-            <a:r>
-              <a:rPr lang="en-US" dirty="0"/>
-              <a:t>precision score compared to logistic regression model’s </a:t>
-            </a:r>
-            <a:r>
-              <a:rPr lang="en-US" dirty="0" smtClean="0"/>
-              <a:t>0.71.  </a:t>
-            </a:r>
-            <a:r>
-              <a:rPr lang="en-US" dirty="0"/>
-              <a:t>Rental investors could use my SVC based model to find the right zip codes for their next profitable rental investment. </a:t>
-            </a:r>
-          </a:p>
-          <a:p>
-            <a:endParaRPr lang="en-US" dirty="0"/>
-          </a:p>
-        </p:txBody>
-      </p:sp>
-    </p:spTree>
-    <p:extLst>
-      <p:ext uri="{BB962C8B-B14F-4D97-AF65-F5344CB8AC3E}">
-        <p14:creationId xmlns:p14="http://schemas.microsoft.com/office/powerpoint/2010/main" val="4230663827"/>
       </p:ext>
     </p:extLst>
   </p:cSld>
@@ -9474,10 +9702,210 @@
             <p:ph type="title"/>
           </p:nvPr>
         </p:nvSpPr>
+        <p:spPr/>
+        <p:txBody>
+          <a:bodyPr>
+            <a:normAutofit/>
+          </a:bodyPr>
+          <a:lstStyle/>
+          <a:p>
+            <a:pPr algn="l"/>
+            <a:r>
+              <a:rPr lang="en-US" b="1" dirty="0"/>
+              <a:t>Overall Conclusion</a:t>
+            </a:r>
+            <a:endParaRPr lang="en-US" dirty="0"/>
+          </a:p>
+        </p:txBody>
+      </p:sp>
+      <p:sp>
+        <p:nvSpPr>
+          <p:cNvPr id="3" name="Content Placeholder 2"/>
+          <p:cNvSpPr>
+            <a:spLocks noGrp="1"/>
+          </p:cNvSpPr>
+          <p:nvPr>
+            <p:ph idx="1"/>
+          </p:nvPr>
+        </p:nvSpPr>
+        <p:spPr/>
+        <p:txBody>
+          <a:bodyPr>
+            <a:normAutofit/>
+          </a:bodyPr>
+          <a:lstStyle/>
+          <a:p>
+            <a:r>
+              <a:rPr lang="en-US" dirty="0" smtClean="0"/>
+              <a:t>Unique </a:t>
+            </a:r>
+            <a:r>
+              <a:rPr lang="en-US" dirty="0"/>
+              <a:t>characteristics of the high potential “hot” zip </a:t>
+            </a:r>
+            <a:r>
+              <a:rPr lang="en-US" dirty="0" smtClean="0"/>
+              <a:t>codes</a:t>
+            </a:r>
+          </a:p>
+          <a:p>
+            <a:pPr lvl="1"/>
+            <a:r>
+              <a:rPr lang="en-US" dirty="0" smtClean="0"/>
+              <a:t>S</a:t>
+            </a:r>
+            <a:r>
+              <a:rPr lang="en-US" dirty="0" smtClean="0"/>
+              <a:t>pread </a:t>
+            </a:r>
+            <a:r>
+              <a:rPr lang="en-US" dirty="0"/>
+              <a:t>over Northern and Southern California.  </a:t>
+            </a:r>
+            <a:endParaRPr lang="en-US" dirty="0"/>
+          </a:p>
+          <a:p>
+            <a:pPr lvl="1"/>
+            <a:r>
+              <a:rPr lang="en-US" dirty="0"/>
+              <a:t>H</a:t>
+            </a:r>
+            <a:r>
+              <a:rPr lang="en-US" dirty="0" smtClean="0"/>
+              <a:t>ave </a:t>
+            </a:r>
+            <a:r>
+              <a:rPr lang="en-US" dirty="0"/>
+              <a:t>slightly higher estimated rent per square foot as well as price-to-rent </a:t>
+            </a:r>
+            <a:r>
+              <a:rPr lang="en-US" dirty="0" smtClean="0"/>
+              <a:t>ratio</a:t>
+            </a:r>
+          </a:p>
+          <a:p>
+            <a:pPr lvl="1"/>
+            <a:r>
+              <a:rPr lang="en-US" dirty="0" smtClean="0"/>
+              <a:t>Adjusted </a:t>
+            </a:r>
+            <a:r>
+              <a:rPr lang="en-US" dirty="0"/>
+              <a:t>gross income </a:t>
+            </a:r>
+            <a:r>
+              <a:rPr lang="en-US" dirty="0" smtClean="0"/>
+              <a:t>lower </a:t>
+            </a:r>
+            <a:r>
+              <a:rPr lang="en-US" dirty="0"/>
+              <a:t>than “cold” zip codes.  </a:t>
+            </a:r>
+            <a:endParaRPr lang="en-US" dirty="0" smtClean="0"/>
+          </a:p>
+          <a:p>
+            <a:pPr lvl="1"/>
+            <a:r>
+              <a:rPr lang="en-US" dirty="0" smtClean="0"/>
+              <a:t>Have </a:t>
+            </a:r>
+            <a:r>
+              <a:rPr lang="en-US" dirty="0"/>
+              <a:t>lower home price than “cold” zip codes for all </a:t>
+            </a:r>
+            <a:r>
+              <a:rPr lang="en-US" dirty="0" smtClean="0"/>
+              <a:t>sizes except </a:t>
+            </a:r>
+            <a:r>
+              <a:rPr lang="en-US" dirty="0"/>
+              <a:t>those one bedroom </a:t>
+            </a:r>
+            <a:r>
+              <a:rPr lang="en-US" dirty="0" smtClean="0"/>
+              <a:t>homes</a:t>
+            </a:r>
+            <a:endParaRPr lang="en-US" dirty="0"/>
+          </a:p>
+        </p:txBody>
+      </p:sp>
+    </p:spTree>
+    <p:extLst>
+      <p:ext uri="{BB962C8B-B14F-4D97-AF65-F5344CB8AC3E}">
+        <p14:creationId xmlns:p14="http://schemas.microsoft.com/office/powerpoint/2010/main" val="4230663827"/>
+      </p:ext>
+    </p:extLst>
+  </p:cSld>
+  <p:clrMapOvr>
+    <a:masterClrMapping/>
+  </p:clrMapOvr>
+  <p:timing>
+    <p:tnLst>
+      <p:par>
+        <p:cTn id="1" dur="indefinite" restart="never" nodeType="tmRoot"/>
+      </p:par>
+    </p:tnLst>
+  </p:timing>
+</p:sld>
+</file>
+
+<file path=ppt/slides/slide19.xml><?xml version="1.0" encoding="utf-8"?>
+<p:sld xmlns:a="http://schemas.openxmlformats.org/drawingml/2006/main" xmlns:r="http://schemas.openxmlformats.org/officeDocument/2006/relationships" xmlns:p="http://schemas.openxmlformats.org/presentationml/2006/main">
+  <p:cSld>
+    <p:spTree>
+      <p:nvGrpSpPr>
+        <p:cNvPr id="1" name=""/>
+        <p:cNvGrpSpPr/>
+        <p:nvPr/>
+      </p:nvGrpSpPr>
+      <p:grpSpPr>
+        <a:xfrm>
+          <a:off x="0" y="0"/>
+          <a:ext cx="0" cy="0"/>
+          <a:chOff x="0" y="0"/>
+          <a:chExt cx="0" cy="0"/>
+        </a:xfrm>
+      </p:grpSpPr>
+      <p:sp>
+        <p:nvSpPr>
+          <p:cNvPr id="2" name="Title 1"/>
+          <p:cNvSpPr>
+            <a:spLocks noGrp="1"/>
+          </p:cNvSpPr>
+          <p:nvPr>
+            <p:ph type="title"/>
+          </p:nvPr>
+        </p:nvSpPr>
+        <p:spPr/>
+        <p:txBody>
+          <a:bodyPr>
+            <a:normAutofit/>
+          </a:bodyPr>
+          <a:lstStyle/>
+          <a:p>
+            <a:pPr algn="l"/>
+            <a:r>
+              <a:rPr lang="en-US" b="1" dirty="0"/>
+              <a:t>Overall Conclusion</a:t>
+            </a:r>
+            <a:endParaRPr lang="en-US" dirty="0"/>
+          </a:p>
+        </p:txBody>
+      </p:sp>
+      <p:sp>
+        <p:nvSpPr>
+          <p:cNvPr id="3" name="Content Placeholder 2"/>
+          <p:cNvSpPr>
+            <a:spLocks noGrp="1"/>
+          </p:cNvSpPr>
+          <p:nvPr>
+            <p:ph idx="1"/>
+          </p:nvPr>
+        </p:nvSpPr>
         <p:spPr>
           <a:xfrm>
-            <a:off x="685800" y="2895600"/>
-            <a:ext cx="8229600" cy="1143000"/>
+            <a:off x="685800" y="1600200"/>
+            <a:ext cx="7315200" cy="4525963"/>
           </a:xfrm>
         </p:spPr>
         <p:txBody>
@@ -9487,8 +9915,117 @@
           <a:lstStyle/>
           <a:p>
             <a:r>
-              <a:rPr lang="en-US" b="1" dirty="0" smtClean="0"/>
-              <a:t>THANK YOU</a:t>
+              <a:rPr lang="en-US" dirty="0"/>
+              <a:t>Tried two modeling </a:t>
+            </a:r>
+            <a:r>
+              <a:rPr lang="en-US" dirty="0" smtClean="0"/>
+              <a:t>algorithm to predict “</a:t>
+            </a:r>
+            <a:r>
+              <a:rPr lang="en-US" dirty="0" smtClean="0"/>
+              <a:t>hot</a:t>
+            </a:r>
+            <a:r>
+              <a:rPr lang="en-US" dirty="0"/>
+              <a:t>” zip </a:t>
+            </a:r>
+            <a:r>
+              <a:rPr lang="en-US" dirty="0" smtClean="0"/>
+              <a:t>codes</a:t>
+            </a:r>
+          </a:p>
+          <a:p>
+            <a:pPr lvl="1"/>
+            <a:r>
+              <a:rPr lang="en-US" dirty="0" smtClean="0"/>
+              <a:t>Logistic </a:t>
+            </a:r>
+            <a:r>
+              <a:rPr lang="en-US" dirty="0" smtClean="0"/>
+              <a:t>R</a:t>
+            </a:r>
+            <a:r>
+              <a:rPr lang="en-US" dirty="0"/>
+              <a:t>egression </a:t>
+            </a:r>
+            <a:endParaRPr lang="en-US" dirty="0" smtClean="0"/>
+          </a:p>
+          <a:p>
+            <a:pPr lvl="2"/>
+            <a:r>
+              <a:rPr lang="en-US" dirty="0" smtClean="0"/>
+              <a:t>precision score: 71%</a:t>
+            </a:r>
+            <a:endParaRPr lang="en-US" dirty="0" smtClean="0"/>
+          </a:p>
+          <a:p>
+            <a:pPr lvl="1"/>
+            <a:r>
+              <a:rPr lang="en-US" dirty="0"/>
+              <a:t>S</a:t>
+            </a:r>
+            <a:r>
+              <a:rPr lang="en-US" dirty="0" smtClean="0"/>
+              <a:t>upport </a:t>
+            </a:r>
+            <a:r>
+              <a:rPr lang="en-US" dirty="0"/>
+              <a:t>V</a:t>
+            </a:r>
+            <a:r>
+              <a:rPr lang="en-US" dirty="0" smtClean="0"/>
+              <a:t>ector </a:t>
+            </a:r>
+            <a:r>
+              <a:rPr lang="en-US" dirty="0" smtClean="0"/>
+              <a:t>C</a:t>
+            </a:r>
+            <a:r>
+              <a:rPr lang="en-US" dirty="0" smtClean="0"/>
+              <a:t>lassifier (</a:t>
+            </a:r>
+            <a:r>
+              <a:rPr lang="en-US" dirty="0"/>
+              <a:t>SVC) </a:t>
+            </a:r>
+            <a:endParaRPr lang="en-US" dirty="0" smtClean="0"/>
+          </a:p>
+          <a:p>
+            <a:pPr lvl="2"/>
+            <a:r>
+              <a:rPr lang="en-US" dirty="0" smtClean="0"/>
+              <a:t>precision score: 96%</a:t>
+            </a:r>
+            <a:endParaRPr lang="en-US" dirty="0" smtClean="0"/>
+          </a:p>
+          <a:p>
+            <a:r>
+              <a:rPr lang="en-US" dirty="0" smtClean="0"/>
+              <a:t>Better </a:t>
+            </a:r>
+            <a:r>
+              <a:rPr lang="en-US" dirty="0"/>
+              <a:t>M</a:t>
+            </a:r>
+            <a:r>
+              <a:rPr lang="en-US" dirty="0" smtClean="0"/>
+              <a:t>odel for R</a:t>
+            </a:r>
+            <a:r>
+              <a:rPr lang="en-US" dirty="0" smtClean="0"/>
+              <a:t>ental investors:</a:t>
+            </a:r>
+          </a:p>
+          <a:p>
+            <a:pPr lvl="1"/>
+            <a:r>
+              <a:rPr lang="en-US" dirty="0"/>
+              <a:t>Support Vector Classifier (SVC</a:t>
+            </a:r>
+            <a:r>
+              <a:rPr lang="en-US" dirty="0" smtClean="0"/>
+              <a:t>)</a:t>
             </a:r>
             <a:endParaRPr lang="en-US" dirty="0"/>
           </a:p>
@@ -9497,7 +10034,7 @@
     </p:spTree>
     <p:extLst>
       <p:ext uri="{BB962C8B-B14F-4D97-AF65-F5344CB8AC3E}">
-        <p14:creationId xmlns:p14="http://schemas.microsoft.com/office/powerpoint/2010/main" val="4230663827"/>
+        <p14:creationId xmlns:p14="http://schemas.microsoft.com/office/powerpoint/2010/main" val="3342932017"/>
       </p:ext>
     </p:extLst>
   </p:cSld>
@@ -9655,8 +10192,8 @@
         </p:blipFill>
         <p:spPr bwMode="auto">
           <a:xfrm>
-            <a:off x="5257800" y="2286000"/>
-            <a:ext cx="3681341" cy="2895600"/>
+            <a:off x="5600891" y="2286000"/>
+            <a:ext cx="3390709" cy="2667000"/>
           </a:xfrm>
           <a:prstGeom prst="rect">
             <a:avLst/>
@@ -9706,6 +10243,73 @@
 </p:sld>
 </file>
 
+<file path=ppt/slides/slide20.xml><?xml version="1.0" encoding="utf-8"?>
+<p:sld xmlns:a="http://schemas.openxmlformats.org/drawingml/2006/main" xmlns:r="http://schemas.openxmlformats.org/officeDocument/2006/relationships" xmlns:p="http://schemas.openxmlformats.org/presentationml/2006/main">
+  <p:cSld>
+    <p:spTree>
+      <p:nvGrpSpPr>
+        <p:cNvPr id="1" name=""/>
+        <p:cNvGrpSpPr/>
+        <p:nvPr/>
+      </p:nvGrpSpPr>
+      <p:grpSpPr>
+        <a:xfrm>
+          <a:off x="0" y="0"/>
+          <a:ext cx="0" cy="0"/>
+          <a:chOff x="0" y="0"/>
+          <a:chExt cx="0" cy="0"/>
+        </a:xfrm>
+      </p:grpSpPr>
+      <p:sp>
+        <p:nvSpPr>
+          <p:cNvPr id="2" name="Title 1"/>
+          <p:cNvSpPr>
+            <a:spLocks noGrp="1"/>
+          </p:cNvSpPr>
+          <p:nvPr>
+            <p:ph type="title"/>
+          </p:nvPr>
+        </p:nvSpPr>
+        <p:spPr>
+          <a:xfrm>
+            <a:off x="685800" y="2895600"/>
+            <a:ext cx="8229600" cy="1143000"/>
+          </a:xfrm>
+        </p:spPr>
+        <p:txBody>
+          <a:bodyPr>
+            <a:normAutofit/>
+          </a:bodyPr>
+          <a:lstStyle/>
+          <a:p>
+            <a:r>
+              <a:rPr lang="en-US" b="1" dirty="0" smtClean="0"/>
+              <a:t>THANK YOU</a:t>
+            </a:r>
+            <a:endParaRPr lang="en-US" dirty="0"/>
+          </a:p>
+        </p:txBody>
+      </p:sp>
+    </p:spTree>
+    <p:extLst>
+      <p:ext uri="{BB962C8B-B14F-4D97-AF65-F5344CB8AC3E}">
+        <p14:creationId xmlns:p14="http://schemas.microsoft.com/office/powerpoint/2010/main" val="4230663827"/>
+      </p:ext>
+    </p:extLst>
+  </p:cSld>
+  <p:clrMapOvr>
+    <a:masterClrMapping/>
+  </p:clrMapOvr>
+  <p:timing>
+    <p:tnLst>
+      <p:par>
+        <p:cTn id="1" dur="indefinite" restart="never" nodeType="tmRoot"/>
+      </p:par>
+    </p:tnLst>
+  </p:timing>
+</p:sld>
+</file>
+
 <file path=ppt/slides/slide3.xml><?xml version="1.0" encoding="utf-8"?>
 <p:sld xmlns:a="http://schemas.openxmlformats.org/drawingml/2006/main" xmlns:r="http://schemas.openxmlformats.org/officeDocument/2006/relationships" xmlns:p="http://schemas.openxmlformats.org/presentationml/2006/main">
   <p:cSld>
@@ -9886,8 +10490,8 @@
         </p:blipFill>
         <p:spPr bwMode="auto">
           <a:xfrm>
-            <a:off x="6705600" y="1371600"/>
-            <a:ext cx="1905000" cy="1905000"/>
+            <a:off x="7315200" y="1295400"/>
+            <a:ext cx="1524000" cy="1524000"/>
           </a:xfrm>
           <a:prstGeom prst="rect">
             <a:avLst/>
@@ -9940,8 +10544,8 @@
         </p:blipFill>
         <p:spPr bwMode="auto">
           <a:xfrm>
-            <a:off x="6509471" y="4347595"/>
-            <a:ext cx="2457450" cy="834005"/>
+            <a:off x="7162800" y="4560944"/>
+            <a:ext cx="1828800" cy="620655"/>
           </a:xfrm>
           <a:prstGeom prst="rect">
             <a:avLst/>
@@ -10044,10 +10648,15 @@
             <p:ph idx="1"/>
           </p:nvPr>
         </p:nvSpPr>
-        <p:spPr/>
+        <p:spPr>
+          <a:xfrm>
+            <a:off x="762000" y="1600200"/>
+            <a:ext cx="7696200" cy="4525963"/>
+          </a:xfrm>
+        </p:spPr>
         <p:txBody>
           <a:bodyPr>
-            <a:normAutofit fontScale="77500" lnSpcReduction="20000"/>
+            <a:normAutofit fontScale="70000" lnSpcReduction="20000"/>
           </a:bodyPr>
           <a:lstStyle/>
           <a:p>
@@ -10065,7 +10674,19 @@
             </a:r>
             <a:r>
               <a:rPr lang="en-US" dirty="0"/>
-              <a:t>anomaly detection to discover which zip codes have success </a:t>
+              <a:t>anomaly detection </a:t>
+            </a:r>
+            <a:endParaRPr lang="en-US" dirty="0" smtClean="0"/>
+          </a:p>
+          <a:p>
+            <a:pPr lvl="2"/>
+            <a:r>
+              <a:rPr lang="en-US" dirty="0" smtClean="0"/>
+              <a:t>Discover </a:t>
+            </a:r>
+            <a:r>
+              <a:rPr lang="en-US" dirty="0"/>
+              <a:t>which zip codes have success </a:t>
             </a:r>
             <a:r>
               <a:rPr lang="en-US" dirty="0" smtClean="0"/>
@@ -10073,7 +10694,34 @@
             </a:r>
             <a:r>
               <a:rPr lang="en-US" dirty="0"/>
-              <a:t>of upward price appreciation. The anomaly detection technique used is to compare new monthly home price with historical price as well as the price change of the surrounding areas.  A zip code is considered to have a spike when it increases significantly over both its previous months and also the average of its entire region. </a:t>
+              <a:t>of upward price </a:t>
+            </a:r>
+            <a:r>
+              <a:rPr lang="en-US" dirty="0" smtClean="0"/>
+              <a:t>appreciation</a:t>
+            </a:r>
+          </a:p>
+          <a:p>
+            <a:pPr lvl="2"/>
+            <a:r>
+              <a:rPr lang="en-US" dirty="0" smtClean="0"/>
+              <a:t>Compare </a:t>
+            </a:r>
+            <a:r>
+              <a:rPr lang="en-US" dirty="0"/>
+              <a:t>new monthly home price with historical price as well as the price change of the surrounding areas.  </a:t>
+            </a:r>
+            <a:endParaRPr lang="en-US" dirty="0" smtClean="0"/>
+          </a:p>
+          <a:p>
+            <a:pPr lvl="1"/>
+            <a:r>
+              <a:rPr lang="en-US" dirty="0" smtClean="0"/>
+              <a:t>A </a:t>
+            </a:r>
+            <a:r>
+              <a:rPr lang="en-US" dirty="0"/>
+              <a:t>zip code is considered to have a spike when it increases significantly over both its previous months and also the average of its entire region. </a:t>
             </a:r>
           </a:p>
           <a:p>
@@ -10086,8 +10734,58 @@
           <a:p>
             <a:pPr lvl="1"/>
             <a:r>
+              <a:rPr lang="en-US" dirty="0" smtClean="0"/>
+              <a:t>Collect </a:t>
+            </a:r>
+            <a:r>
               <a:rPr lang="en-US" dirty="0"/>
-              <a:t>More data such as IRS income was collected for the zip codes that have sudden increase of home price.  Those new dataset will be used to figure out which features contribute to the price appreciation and from that a predictive model was created to predict which zip codes would have extraordinary price appreciation in the near future.</a:t>
+              <a:t>more data such as IRS income </a:t>
+            </a:r>
+            <a:r>
+              <a:rPr lang="en-US" dirty="0" smtClean="0"/>
+              <a:t>in zip codes that have </a:t>
+            </a:r>
+            <a:r>
+              <a:rPr lang="en-US" dirty="0"/>
+              <a:t>sudden increase of home </a:t>
+            </a:r>
+            <a:r>
+              <a:rPr lang="en-US" dirty="0" smtClean="0"/>
+              <a:t>price</a:t>
+            </a:r>
+          </a:p>
+          <a:p>
+            <a:pPr lvl="1"/>
+            <a:r>
+              <a:rPr lang="en-US" dirty="0" smtClean="0"/>
+              <a:t>Figure </a:t>
+            </a:r>
+            <a:r>
+              <a:rPr lang="en-US" dirty="0"/>
+              <a:t>out which features contribute to the price </a:t>
+            </a:r>
+            <a:r>
+              <a:rPr lang="en-US" dirty="0" smtClean="0"/>
+              <a:t>appreciation</a:t>
+            </a:r>
+          </a:p>
+          <a:p>
+            <a:pPr lvl="1"/>
+            <a:r>
+              <a:rPr lang="en-US" dirty="0" smtClean="0"/>
+              <a:t>Create </a:t>
+            </a:r>
+            <a:r>
+              <a:rPr lang="en-US" dirty="0"/>
+              <a:t>a predictive model </a:t>
+            </a:r>
+            <a:r>
+              <a:rPr lang="en-US" dirty="0" smtClean="0"/>
+              <a:t>to </a:t>
+            </a:r>
+            <a:r>
+              <a:rPr lang="en-US" dirty="0"/>
+              <a:t>predict which zip codes would have extraordinary price appreciation in the near future.</a:t>
             </a:r>
           </a:p>
         </p:txBody>
@@ -11736,7 +12434,15 @@
             <a:pPr algn="l"/>
             <a:r>
               <a:rPr lang="en-US" b="1" dirty="0"/>
-              <a:t>Counting The Number of Hot/Cold Zip codes by Year</a:t>
+              <a:t>Counting The Number of Hot/Cold Zip </a:t>
+            </a:r>
+            <a:r>
+              <a:rPr lang="en-US" b="1" dirty="0" smtClean="0"/>
+              <a:t>Codes </a:t>
+            </a:r>
+            <a:r>
+              <a:rPr lang="en-US" b="1" dirty="0"/>
+              <a:t>by Year</a:t>
             </a:r>
             <a:endParaRPr lang="en-US" dirty="0"/>
           </a:p>
@@ -11828,7 +12534,15 @@
             <a:pPr algn="l"/>
             <a:r>
               <a:rPr lang="en-US" b="1" dirty="0"/>
-              <a:t>Compare Home Price grouped by Targeted Zip Code</a:t>
+              <a:t>Compare Home Price </a:t>
+            </a:r>
+            <a:r>
+              <a:rPr lang="en-US" b="1" dirty="0" smtClean="0"/>
+              <a:t>Grouped </a:t>
+            </a:r>
+            <a:r>
+              <a:rPr lang="en-US" b="1" dirty="0"/>
+              <a:t>by Targeted Zip Code</a:t>
             </a:r>
             <a:endParaRPr lang="en-US" dirty="0"/>
           </a:p>
@@ -11857,8 +12571,8 @@
         </p:blipFill>
         <p:spPr bwMode="auto">
           <a:xfrm>
-            <a:off x="874297" y="990600"/>
-            <a:ext cx="7507703" cy="5105399"/>
+            <a:off x="730876" y="1143000"/>
+            <a:ext cx="7955924" cy="5410199"/>
           </a:xfrm>
           <a:prstGeom prst="rect">
             <a:avLst/>
@@ -11898,52 +12612,6 @@
           </a:extLst>
         </p:spPr>
       </p:pic>
-      <p:sp>
-        <p:nvSpPr>
-          <p:cNvPr id="4" name="Content Placeholder 2"/>
-          <p:cNvSpPr>
-            <a:spLocks noGrp="1"/>
-          </p:cNvSpPr>
-          <p:nvPr>
-            <p:ph idx="1"/>
-          </p:nvPr>
-        </p:nvSpPr>
-        <p:spPr>
-          <a:xfrm>
-            <a:off x="533400" y="6065837"/>
-            <a:ext cx="8229600" cy="487363"/>
-          </a:xfrm>
-        </p:spPr>
-        <p:txBody>
-          <a:bodyPr>
-            <a:noAutofit/>
-          </a:bodyPr>
-          <a:lstStyle/>
-          <a:p>
-            <a:r>
-              <a:rPr lang="en-US" sz="1800" b="1" dirty="0"/>
-              <a:t>O</a:t>
-            </a:r>
-            <a:r>
-              <a:rPr lang="en-US" sz="1800" b="1" dirty="0" smtClean="0"/>
-              <a:t>nly the </a:t>
-            </a:r>
-            <a:r>
-              <a:rPr lang="en-US" sz="1800" b="1" dirty="0"/>
-              <a:t>one </a:t>
-            </a:r>
-            <a:r>
-              <a:rPr lang="en-US" sz="1800" b="1" dirty="0" smtClean="0"/>
-              <a:t>bedroom group </a:t>
-            </a:r>
-            <a:r>
-              <a:rPr lang="en-US" sz="1800" b="1" dirty="0"/>
-              <a:t>whose hot zip codes’ median price is higher than its cold zip codes'</a:t>
-            </a:r>
-            <a:endParaRPr lang="en-US" sz="1800" dirty="0"/>
-          </a:p>
-        </p:txBody>
-      </p:sp>
     </p:spTree>
     <p:extLst>
       <p:ext uri="{BB962C8B-B14F-4D97-AF65-F5344CB8AC3E}">

</xml_diff>